<commit_message>
diagram fixes for ch 7 and 14 and 16
</commit_message>
<xml_diff>
--- a/images/writing/src/imrad.pptx
+++ b/images/writing/src/imrad.pptx
@@ -104,6 +104,11 @@
       </a:defRPr>
     </a:lvl9pPr>
   </p:defaultTextStyle>
+  <p:extLst>
+    <p:ext uri="{EFAFB233-063F-42B5-8137-9DF3F51BA10A}">
+      <p15:sldGuideLst xmlns:p15="http://schemas.microsoft.com/office/powerpoint/2012/main"/>
+    </p:ext>
+  </p:extLst>
 </p:presentation>
 </file>
 
@@ -794,7 +799,7 @@
           <a:p>
             <a:fld id="{8F866045-EF1B-D74B-921C-286B234F8FAD}" type="datetimeFigureOut">
               <a:rPr lang="en-US" smtClean="0"/>
-              <a:t>9/23/22</a:t>
+              <a:t>12/19/23</a:t>
             </a:fld>
             <a:endParaRPr lang="en-US"/>
           </a:p>
@@ -992,7 +997,7 @@
           <a:p>
             <a:fld id="{8F866045-EF1B-D74B-921C-286B234F8FAD}" type="datetimeFigureOut">
               <a:rPr lang="en-US" smtClean="0"/>
-              <a:t>9/23/22</a:t>
+              <a:t>12/19/23</a:t>
             </a:fld>
             <a:endParaRPr lang="en-US"/>
           </a:p>
@@ -1200,7 +1205,7 @@
           <a:p>
             <a:fld id="{8F866045-EF1B-D74B-921C-286B234F8FAD}" type="datetimeFigureOut">
               <a:rPr lang="en-US" smtClean="0"/>
-              <a:t>9/23/22</a:t>
+              <a:t>12/19/23</a:t>
             </a:fld>
             <a:endParaRPr lang="en-US"/>
           </a:p>
@@ -1398,7 +1403,7 @@
           <a:p>
             <a:fld id="{8F866045-EF1B-D74B-921C-286B234F8FAD}" type="datetimeFigureOut">
               <a:rPr lang="en-US" smtClean="0"/>
-              <a:t>9/23/22</a:t>
+              <a:t>12/19/23</a:t>
             </a:fld>
             <a:endParaRPr lang="en-US"/>
           </a:p>
@@ -1673,7 +1678,7 @@
           <a:p>
             <a:fld id="{8F866045-EF1B-D74B-921C-286B234F8FAD}" type="datetimeFigureOut">
               <a:rPr lang="en-US" smtClean="0"/>
-              <a:t>9/23/22</a:t>
+              <a:t>12/19/23</a:t>
             </a:fld>
             <a:endParaRPr lang="en-US"/>
           </a:p>
@@ -1938,7 +1943,7 @@
           <a:p>
             <a:fld id="{8F866045-EF1B-D74B-921C-286B234F8FAD}" type="datetimeFigureOut">
               <a:rPr lang="en-US" smtClean="0"/>
-              <a:t>9/23/22</a:t>
+              <a:t>12/19/23</a:t>
             </a:fld>
             <a:endParaRPr lang="en-US"/>
           </a:p>
@@ -2350,7 +2355,7 @@
           <a:p>
             <a:fld id="{8F866045-EF1B-D74B-921C-286B234F8FAD}" type="datetimeFigureOut">
               <a:rPr lang="en-US" smtClean="0"/>
-              <a:t>9/23/22</a:t>
+              <a:t>12/19/23</a:t>
             </a:fld>
             <a:endParaRPr lang="en-US"/>
           </a:p>
@@ -2491,7 +2496,7 @@
           <a:p>
             <a:fld id="{8F866045-EF1B-D74B-921C-286B234F8FAD}" type="datetimeFigureOut">
               <a:rPr lang="en-US" smtClean="0"/>
-              <a:t>9/23/22</a:t>
+              <a:t>12/19/23</a:t>
             </a:fld>
             <a:endParaRPr lang="en-US"/>
           </a:p>
@@ -2604,7 +2609,7 @@
           <a:p>
             <a:fld id="{8F866045-EF1B-D74B-921C-286B234F8FAD}" type="datetimeFigureOut">
               <a:rPr lang="en-US" smtClean="0"/>
-              <a:t>9/23/22</a:t>
+              <a:t>12/19/23</a:t>
             </a:fld>
             <a:endParaRPr lang="en-US"/>
           </a:p>
@@ -2915,7 +2920,7 @@
           <a:p>
             <a:fld id="{8F866045-EF1B-D74B-921C-286B234F8FAD}" type="datetimeFigureOut">
               <a:rPr lang="en-US" smtClean="0"/>
-              <a:t>9/23/22</a:t>
+              <a:t>12/19/23</a:t>
             </a:fld>
             <a:endParaRPr lang="en-US"/>
           </a:p>
@@ -3203,7 +3208,7 @@
           <a:p>
             <a:fld id="{8F866045-EF1B-D74B-921C-286B234F8FAD}" type="datetimeFigureOut">
               <a:rPr lang="en-US" smtClean="0"/>
-              <a:t>9/23/22</a:t>
+              <a:t>12/19/23</a:t>
             </a:fld>
             <a:endParaRPr lang="en-US"/>
           </a:p>
@@ -3444,7 +3449,7 @@
           <a:p>
             <a:fld id="{8F866045-EF1B-D74B-921C-286B234F8FAD}" type="datetimeFigureOut">
               <a:rPr lang="en-US" smtClean="0"/>
-              <a:t>9/23/22</a:t>
+              <a:t>12/19/23</a:t>
             </a:fld>
             <a:endParaRPr lang="en-US"/>
           </a:p>
@@ -3931,8 +3936,8 @@
               <a:chExt cx="2187360" cy="183960"/>
             </a:xfrm>
           </p:grpSpPr>
-          <mc:AlternateContent xmlns:mc="http://schemas.openxmlformats.org/markup-compatibility/2006">
-            <mc:Choice xmlns:p14="http://schemas.microsoft.com/office/powerpoint/2010/main" Requires="p14">
+          <mc:AlternateContent xmlns:mc="http://schemas.openxmlformats.org/markup-compatibility/2006" xmlns:p14="http://schemas.microsoft.com/office/powerpoint/2010/main">
+            <mc:Choice Requires="p14">
               <p:contentPart p14:bwMode="auto" r:id="rId3">
                 <p14:nvContentPartPr>
                   <p14:cNvPr id="7" name="Ink 6">
@@ -3951,7 +3956,7 @@
                 </p14:xfrm>
               </p:contentPart>
             </mc:Choice>
-            <mc:Fallback>
+            <mc:Fallback xmlns="">
               <p:pic>
                 <p:nvPicPr>
                   <p:cNvPr id="7" name="Ink 6">
@@ -3982,8 +3987,8 @@
               </p:pic>
             </mc:Fallback>
           </mc:AlternateContent>
-          <mc:AlternateContent xmlns:mc="http://schemas.openxmlformats.org/markup-compatibility/2006">
-            <mc:Choice xmlns:p14="http://schemas.microsoft.com/office/powerpoint/2010/main" Requires="p14">
+          <mc:AlternateContent xmlns:mc="http://schemas.openxmlformats.org/markup-compatibility/2006" xmlns:p14="http://schemas.microsoft.com/office/powerpoint/2010/main">
+            <mc:Choice Requires="p14">
               <p:contentPart p14:bwMode="auto" r:id="rId5">
                 <p14:nvContentPartPr>
                   <p14:cNvPr id="8" name="Ink 7">
@@ -4002,7 +4007,7 @@
                 </p14:xfrm>
               </p:contentPart>
             </mc:Choice>
-            <mc:Fallback>
+            <mc:Fallback xmlns="">
               <p:pic>
                 <p:nvPicPr>
                   <p:cNvPr id="8" name="Ink 7">
@@ -4054,8 +4059,8 @@
               <a:chExt cx="154800" cy="235080"/>
             </a:xfrm>
           </p:grpSpPr>
-          <mc:AlternateContent xmlns:mc="http://schemas.openxmlformats.org/markup-compatibility/2006">
-            <mc:Choice xmlns:p14="http://schemas.microsoft.com/office/powerpoint/2010/main" Requires="p14">
+          <mc:AlternateContent xmlns:mc="http://schemas.openxmlformats.org/markup-compatibility/2006" xmlns:p14="http://schemas.microsoft.com/office/powerpoint/2010/main">
+            <mc:Choice Requires="p14">
               <p:contentPart p14:bwMode="auto" r:id="rId7">
                 <p14:nvContentPartPr>
                   <p14:cNvPr id="13" name="Ink 12">
@@ -4074,7 +4079,7 @@
                 </p14:xfrm>
               </p:contentPart>
             </mc:Choice>
-            <mc:Fallback>
+            <mc:Fallback xmlns="">
               <p:pic>
                 <p:nvPicPr>
                   <p:cNvPr id="13" name="Ink 12">
@@ -4105,8 +4110,8 @@
               </p:pic>
             </mc:Fallback>
           </mc:AlternateContent>
-          <mc:AlternateContent xmlns:mc="http://schemas.openxmlformats.org/markup-compatibility/2006">
-            <mc:Choice xmlns:p14="http://schemas.microsoft.com/office/powerpoint/2010/main" Requires="p14">
+          <mc:AlternateContent xmlns:mc="http://schemas.openxmlformats.org/markup-compatibility/2006" xmlns:p14="http://schemas.microsoft.com/office/powerpoint/2010/main">
+            <mc:Choice Requires="p14">
               <p:contentPart p14:bwMode="auto" r:id="rId9">
                 <p14:nvContentPartPr>
                   <p14:cNvPr id="14" name="Ink 13">
@@ -4125,7 +4130,7 @@
                 </p14:xfrm>
               </p:contentPart>
             </mc:Choice>
-            <mc:Fallback>
+            <mc:Fallback xmlns="">
               <p:pic>
                 <p:nvPicPr>
                   <p:cNvPr id="14" name="Ink 13">
@@ -4187,7 +4192,10 @@
           <a:lstStyle/>
           <a:p>
             <a:r>
-              <a:rPr lang="en-US" dirty="0"/>
+              <a:rPr lang="en-US" dirty="0">
+                <a:latin typeface="Source Sans Pro" panose="020B0503030403020204" pitchFamily="34" charset="0"/>
+                <a:ea typeface="Source Sans Pro" panose="020B0503030403020204" pitchFamily="34" charset="0"/>
+              </a:rPr>
               <a:t>Breadth of writing</a:t>
             </a:r>
           </a:p>
@@ -4208,7 +4216,7 @@
         <p:spPr>
           <a:xfrm>
             <a:off x="7455385" y="1978430"/>
-            <a:ext cx="1352230" cy="369332"/>
+            <a:ext cx="1401346" cy="369332"/>
           </a:xfrm>
           <a:prstGeom prst="rect">
             <a:avLst/>
@@ -4222,7 +4230,10 @@
           <a:lstStyle/>
           <a:p>
             <a:r>
-              <a:rPr lang="en-US" dirty="0"/>
+              <a:rPr lang="en-US" dirty="0">
+                <a:latin typeface="Source Sans Pro" panose="020B0503030403020204" pitchFamily="34" charset="0"/>
+                <a:ea typeface="Source Sans Pro" panose="020B0503030403020204" pitchFamily="34" charset="0"/>
+              </a:rPr>
               <a:t>Introduction</a:t>
             </a:r>
           </a:p>
@@ -4257,7 +4268,10 @@
           <a:lstStyle/>
           <a:p>
             <a:r>
-              <a:rPr lang="en-US" dirty="0"/>
+              <a:rPr lang="en-US" dirty="0">
+                <a:latin typeface="Source Sans Pro" panose="020B0503030403020204" pitchFamily="34" charset="0"/>
+                <a:ea typeface="Source Sans Pro" panose="020B0503030403020204" pitchFamily="34" charset="0"/>
+              </a:rPr>
               <a:t>Methods</a:t>
             </a:r>
           </a:p>
@@ -4277,8 +4291,8 @@
         </p:nvSpPr>
         <p:spPr>
           <a:xfrm>
-            <a:off x="7548648" y="5143737"/>
-            <a:ext cx="1165704" cy="406265"/>
+            <a:off x="7548648" y="5188341"/>
+            <a:ext cx="1210588" cy="369332"/>
           </a:xfrm>
           <a:prstGeom prst="rect">
             <a:avLst/>
@@ -4292,7 +4306,10 @@
           <a:lstStyle/>
           <a:p>
             <a:r>
-              <a:rPr lang="en-US" dirty="0"/>
+              <a:rPr lang="en-US" dirty="0">
+                <a:latin typeface="Source Sans Pro" panose="020B0503030403020204" pitchFamily="34" charset="0"/>
+                <a:ea typeface="Source Sans Pro" panose="020B0503030403020204" pitchFamily="34" charset="0"/>
+              </a:rPr>
               <a:t>Discussion</a:t>
             </a:r>
           </a:p>
@@ -4312,8 +4329,8 @@
         </p:nvSpPr>
         <p:spPr>
           <a:xfrm>
-            <a:off x="7705358" y="4150824"/>
-            <a:ext cx="852285" cy="369332"/>
+            <a:off x="7705358" y="4195428"/>
+            <a:ext cx="885179" cy="369332"/>
           </a:xfrm>
           <a:prstGeom prst="rect">
             <a:avLst/>
@@ -4327,14 +4344,17 @@
           <a:lstStyle/>
           <a:p>
             <a:r>
-              <a:rPr lang="en-US" dirty="0"/>
+              <a:rPr lang="en-US" dirty="0">
+                <a:latin typeface="Source Sans Pro" panose="020B0503030403020204" pitchFamily="34" charset="0"/>
+                <a:ea typeface="Source Sans Pro" panose="020B0503030403020204" pitchFamily="34" charset="0"/>
+              </a:rPr>
               <a:t>Results</a:t>
             </a:r>
           </a:p>
         </p:txBody>
       </p:sp>
-      <mc:AlternateContent xmlns:mc="http://schemas.openxmlformats.org/markup-compatibility/2006">
-        <mc:Choice xmlns:p14="http://schemas.microsoft.com/office/powerpoint/2010/main" Requires="p14">
+      <mc:AlternateContent xmlns:mc="http://schemas.openxmlformats.org/markup-compatibility/2006" xmlns:p14="http://schemas.microsoft.com/office/powerpoint/2010/main">
+        <mc:Choice Requires="p14">
           <p:contentPart p14:bwMode="auto" r:id="rId11">
             <p14:nvContentPartPr>
               <p14:cNvPr id="23" name="Ink 22">
@@ -4353,7 +4373,7 @@
             </p14:xfrm>
           </p:contentPart>
         </mc:Choice>
-        <mc:Fallback>
+        <mc:Fallback xmlns="">
           <p:pic>
             <p:nvPicPr>
               <p:cNvPr id="23" name="Ink 22">
@@ -4404,8 +4424,8 @@
             <a:chExt cx="1458360" cy="929880"/>
           </a:xfrm>
         </p:grpSpPr>
-        <mc:AlternateContent xmlns:mc="http://schemas.openxmlformats.org/markup-compatibility/2006">
-          <mc:Choice xmlns:p14="http://schemas.microsoft.com/office/powerpoint/2010/main" Requires="p14">
+        <mc:AlternateContent xmlns:mc="http://schemas.openxmlformats.org/markup-compatibility/2006" xmlns:p14="http://schemas.microsoft.com/office/powerpoint/2010/main">
+          <mc:Choice Requires="p14">
             <p:contentPart p14:bwMode="auto" r:id="rId13">
               <p14:nvContentPartPr>
                 <p14:cNvPr id="25" name="Ink 24">
@@ -4424,7 +4444,7 @@
               </p14:xfrm>
             </p:contentPart>
           </mc:Choice>
-          <mc:Fallback>
+          <mc:Fallback xmlns="">
             <p:pic>
               <p:nvPicPr>
                 <p:cNvPr id="25" name="Ink 24">
@@ -4455,8 +4475,8 @@
             </p:pic>
           </mc:Fallback>
         </mc:AlternateContent>
-        <mc:AlternateContent xmlns:mc="http://schemas.openxmlformats.org/markup-compatibility/2006">
-          <mc:Choice xmlns:p14="http://schemas.microsoft.com/office/powerpoint/2010/main" Requires="p14">
+        <mc:AlternateContent xmlns:mc="http://schemas.openxmlformats.org/markup-compatibility/2006" xmlns:p14="http://schemas.microsoft.com/office/powerpoint/2010/main">
+          <mc:Choice Requires="p14">
             <p:contentPart p14:bwMode="auto" r:id="rId15">
               <p14:nvContentPartPr>
                 <p14:cNvPr id="30" name="Ink 29">
@@ -4475,7 +4495,7 @@
               </p14:xfrm>
             </p:contentPart>
           </mc:Choice>
-          <mc:Fallback>
+          <mc:Fallback xmlns="">
             <p:pic>
               <p:nvPicPr>
                 <p:cNvPr id="30" name="Ink 29">
@@ -4507,8 +4527,8 @@
           </mc:Fallback>
         </mc:AlternateContent>
       </p:grpSp>
-      <mc:AlternateContent xmlns:mc="http://schemas.openxmlformats.org/markup-compatibility/2006">
-        <mc:Choice xmlns:p14="http://schemas.microsoft.com/office/powerpoint/2010/main" Requires="p14">
+      <mc:AlternateContent xmlns:mc="http://schemas.openxmlformats.org/markup-compatibility/2006" xmlns:p14="http://schemas.microsoft.com/office/powerpoint/2010/main">
+        <mc:Choice Requires="p14">
           <p:contentPart p14:bwMode="auto" r:id="rId17">
             <p14:nvContentPartPr>
               <p14:cNvPr id="32" name="Ink 31">
@@ -4527,7 +4547,7 @@
             </p14:xfrm>
           </p:contentPart>
         </mc:Choice>
-        <mc:Fallback>
+        <mc:Fallback xmlns="">
           <p:pic>
             <p:nvPicPr>
               <p:cNvPr id="32" name="Ink 31">
@@ -4558,8 +4578,8 @@
           </p:pic>
         </mc:Fallback>
       </mc:AlternateContent>
-      <mc:AlternateContent xmlns:mc="http://schemas.openxmlformats.org/markup-compatibility/2006">
-        <mc:Choice xmlns:p14="http://schemas.microsoft.com/office/powerpoint/2010/main" Requires="p14">
+      <mc:AlternateContent xmlns:mc="http://schemas.openxmlformats.org/markup-compatibility/2006" xmlns:p14="http://schemas.microsoft.com/office/powerpoint/2010/main">
+        <mc:Choice Requires="p14">
           <p:contentPart p14:bwMode="auto" r:id="rId19">
             <p14:nvContentPartPr>
               <p14:cNvPr id="35" name="Ink 34">
@@ -4578,7 +4598,7 @@
             </p14:xfrm>
           </p:contentPart>
         </mc:Choice>
-        <mc:Fallback>
+        <mc:Fallback xmlns="">
           <p:pic>
             <p:nvPicPr>
               <p:cNvPr id="35" name="Ink 34">
@@ -4609,8 +4629,8 @@
           </p:pic>
         </mc:Fallback>
       </mc:AlternateContent>
-      <mc:AlternateContent xmlns:mc="http://schemas.openxmlformats.org/markup-compatibility/2006">
-        <mc:Choice xmlns:p14="http://schemas.microsoft.com/office/powerpoint/2010/main" Requires="p14">
+      <mc:AlternateContent xmlns:mc="http://schemas.openxmlformats.org/markup-compatibility/2006" xmlns:p14="http://schemas.microsoft.com/office/powerpoint/2010/main">
+        <mc:Choice Requires="p14">
           <p:contentPart p14:bwMode="auto" r:id="rId21">
             <p14:nvContentPartPr>
               <p14:cNvPr id="36" name="Ink 35">
@@ -4629,7 +4649,7 @@
             </p14:xfrm>
           </p:contentPart>
         </mc:Choice>
-        <mc:Fallback>
+        <mc:Fallback xmlns="">
           <p:pic>
             <p:nvPicPr>
               <p:cNvPr id="36" name="Ink 35">
@@ -4660,8 +4680,8 @@
           </p:pic>
         </mc:Fallback>
       </mc:AlternateContent>
-      <mc:AlternateContent xmlns:mc="http://schemas.openxmlformats.org/markup-compatibility/2006">
-        <mc:Choice xmlns:p14="http://schemas.microsoft.com/office/powerpoint/2010/main" Requires="p14">
+      <mc:AlternateContent xmlns:mc="http://schemas.openxmlformats.org/markup-compatibility/2006" xmlns:p14="http://schemas.microsoft.com/office/powerpoint/2010/main">
+        <mc:Choice Requires="p14">
           <p:contentPart p14:bwMode="auto" r:id="rId23">
             <p14:nvContentPartPr>
               <p14:cNvPr id="40" name="Ink 39">
@@ -4680,7 +4700,7 @@
             </p14:xfrm>
           </p:contentPart>
         </mc:Choice>
-        <mc:Fallback>
+        <mc:Fallback xmlns="">
           <p:pic>
             <p:nvPicPr>
               <p:cNvPr id="40" name="Ink 39">
@@ -4711,8 +4731,8 @@
           </p:pic>
         </mc:Fallback>
       </mc:AlternateContent>
-      <mc:AlternateContent xmlns:mc="http://schemas.openxmlformats.org/markup-compatibility/2006">
-        <mc:Choice xmlns:p14="http://schemas.microsoft.com/office/powerpoint/2010/main" Requires="p14">
+      <mc:AlternateContent xmlns:mc="http://schemas.openxmlformats.org/markup-compatibility/2006" xmlns:p14="http://schemas.microsoft.com/office/powerpoint/2010/main">
+        <mc:Choice Requires="p14">
           <p:contentPart p14:bwMode="auto" r:id="rId25">
             <p14:nvContentPartPr>
               <p14:cNvPr id="43" name="Ink 42">
@@ -4731,7 +4751,7 @@
             </p14:xfrm>
           </p:contentPart>
         </mc:Choice>
-        <mc:Fallback>
+        <mc:Fallback xmlns="">
           <p:pic>
             <p:nvPicPr>
               <p:cNvPr id="43" name="Ink 42">
@@ -4762,8 +4782,8 @@
           </p:pic>
         </mc:Fallback>
       </mc:AlternateContent>
-      <mc:AlternateContent xmlns:mc="http://schemas.openxmlformats.org/markup-compatibility/2006">
-        <mc:Choice xmlns:p14="http://schemas.microsoft.com/office/powerpoint/2010/main" Requires="p14">
+      <mc:AlternateContent xmlns:mc="http://schemas.openxmlformats.org/markup-compatibility/2006" xmlns:p14="http://schemas.microsoft.com/office/powerpoint/2010/main">
+        <mc:Choice Requires="p14">
           <p:contentPart p14:bwMode="auto" r:id="rId27">
             <p14:nvContentPartPr>
               <p14:cNvPr id="49" name="Ink 48">
@@ -4782,7 +4802,7 @@
             </p14:xfrm>
           </p:contentPart>
         </mc:Choice>
-        <mc:Fallback>
+        <mc:Fallback xmlns="">
           <p:pic>
             <p:nvPicPr>
               <p:cNvPr id="49" name="Ink 48">
@@ -4813,8 +4833,8 @@
           </p:pic>
         </mc:Fallback>
       </mc:AlternateContent>
-      <mc:AlternateContent xmlns:mc="http://schemas.openxmlformats.org/markup-compatibility/2006">
-        <mc:Choice xmlns:p14="http://schemas.microsoft.com/office/powerpoint/2010/main" Requires="p14">
+      <mc:AlternateContent xmlns:mc="http://schemas.openxmlformats.org/markup-compatibility/2006" xmlns:p14="http://schemas.microsoft.com/office/powerpoint/2010/main">
+        <mc:Choice Requires="p14">
           <p:contentPart p14:bwMode="auto" r:id="rId29">
             <p14:nvContentPartPr>
               <p14:cNvPr id="51" name="Ink 50">
@@ -4833,7 +4853,7 @@
             </p14:xfrm>
           </p:contentPart>
         </mc:Choice>
-        <mc:Fallback>
+        <mc:Fallback xmlns="">
           <p:pic>
             <p:nvPicPr>
               <p:cNvPr id="51" name="Ink 50">
@@ -4864,8 +4884,8 @@
           </p:pic>
         </mc:Fallback>
       </mc:AlternateContent>
-      <mc:AlternateContent xmlns:mc="http://schemas.openxmlformats.org/markup-compatibility/2006">
-        <mc:Choice xmlns:p14="http://schemas.microsoft.com/office/powerpoint/2010/main" Requires="p14">
+      <mc:AlternateContent xmlns:mc="http://schemas.openxmlformats.org/markup-compatibility/2006" xmlns:p14="http://schemas.microsoft.com/office/powerpoint/2010/main">
+        <mc:Choice Requires="p14">
           <p:contentPart p14:bwMode="auto" r:id="rId31">
             <p14:nvContentPartPr>
               <p14:cNvPr id="52" name="Ink 51">
@@ -4884,7 +4904,7 @@
             </p14:xfrm>
           </p:contentPart>
         </mc:Choice>
-        <mc:Fallback>
+        <mc:Fallback xmlns="">
           <p:pic>
             <p:nvPicPr>
               <p:cNvPr id="52" name="Ink 51">
@@ -4935,8 +4955,8 @@
             <a:chExt cx="2607840" cy="2612520"/>
           </a:xfrm>
         </p:grpSpPr>
-        <mc:AlternateContent xmlns:mc="http://schemas.openxmlformats.org/markup-compatibility/2006">
-          <mc:Choice xmlns:p14="http://schemas.microsoft.com/office/powerpoint/2010/main" Requires="p14">
+        <mc:AlternateContent xmlns:mc="http://schemas.openxmlformats.org/markup-compatibility/2006" xmlns:p14="http://schemas.microsoft.com/office/powerpoint/2010/main">
+          <mc:Choice Requires="p14">
             <p:contentPart p14:bwMode="auto" r:id="rId33">
               <p14:nvContentPartPr>
                 <p14:cNvPr id="37" name="Ink 36">
@@ -4955,7 +4975,7 @@
               </p14:xfrm>
             </p:contentPart>
           </mc:Choice>
-          <mc:Fallback>
+          <mc:Fallback xmlns="">
             <p:pic>
               <p:nvPicPr>
                 <p:cNvPr id="37" name="Ink 36">
@@ -4986,8 +5006,8 @@
             </p:pic>
           </mc:Fallback>
         </mc:AlternateContent>
-        <mc:AlternateContent xmlns:mc="http://schemas.openxmlformats.org/markup-compatibility/2006">
-          <mc:Choice xmlns:p14="http://schemas.microsoft.com/office/powerpoint/2010/main" Requires="p14">
+        <mc:AlternateContent xmlns:mc="http://schemas.openxmlformats.org/markup-compatibility/2006" xmlns:p14="http://schemas.microsoft.com/office/powerpoint/2010/main">
+          <mc:Choice Requires="p14">
             <p:contentPart p14:bwMode="auto" r:id="rId35">
               <p14:nvContentPartPr>
                 <p14:cNvPr id="38" name="Ink 37">
@@ -5006,7 +5026,7 @@
               </p14:xfrm>
             </p:contentPart>
           </mc:Choice>
-          <mc:Fallback>
+          <mc:Fallback xmlns="">
             <p:pic>
               <p:nvPicPr>
                 <p:cNvPr id="38" name="Ink 37">
@@ -5037,8 +5057,8 @@
             </p:pic>
           </mc:Fallback>
         </mc:AlternateContent>
-        <mc:AlternateContent xmlns:mc="http://schemas.openxmlformats.org/markup-compatibility/2006">
-          <mc:Choice xmlns:p14="http://schemas.microsoft.com/office/powerpoint/2010/main" Requires="p14">
+        <mc:AlternateContent xmlns:mc="http://schemas.openxmlformats.org/markup-compatibility/2006" xmlns:p14="http://schemas.microsoft.com/office/powerpoint/2010/main">
+          <mc:Choice Requires="p14">
             <p:contentPart p14:bwMode="auto" r:id="rId37">
               <p14:nvContentPartPr>
                 <p14:cNvPr id="44" name="Ink 43">
@@ -5057,7 +5077,7 @@
               </p14:xfrm>
             </p:contentPart>
           </mc:Choice>
-          <mc:Fallback>
+          <mc:Fallback xmlns="">
             <p:pic>
               <p:nvPicPr>
                 <p:cNvPr id="44" name="Ink 43">
@@ -5088,8 +5108,8 @@
             </p:pic>
           </mc:Fallback>
         </mc:AlternateContent>
-        <mc:AlternateContent xmlns:mc="http://schemas.openxmlformats.org/markup-compatibility/2006">
-          <mc:Choice xmlns:p14="http://schemas.microsoft.com/office/powerpoint/2010/main" Requires="p14">
+        <mc:AlternateContent xmlns:mc="http://schemas.openxmlformats.org/markup-compatibility/2006" xmlns:p14="http://schemas.microsoft.com/office/powerpoint/2010/main">
+          <mc:Choice Requires="p14">
             <p:contentPart p14:bwMode="auto" r:id="rId39">
               <p14:nvContentPartPr>
                 <p14:cNvPr id="46" name="Ink 45">
@@ -5108,7 +5128,7 @@
               </p14:xfrm>
             </p:contentPart>
           </mc:Choice>
-          <mc:Fallback>
+          <mc:Fallback xmlns="">
             <p:pic>
               <p:nvPicPr>
                 <p:cNvPr id="46" name="Ink 45">
@@ -5139,8 +5159,8 @@
             </p:pic>
           </mc:Fallback>
         </mc:AlternateContent>
-        <mc:AlternateContent xmlns:mc="http://schemas.openxmlformats.org/markup-compatibility/2006">
-          <mc:Choice xmlns:p14="http://schemas.microsoft.com/office/powerpoint/2010/main" Requires="p14">
+        <mc:AlternateContent xmlns:mc="http://schemas.openxmlformats.org/markup-compatibility/2006" xmlns:p14="http://schemas.microsoft.com/office/powerpoint/2010/main">
+          <mc:Choice Requires="p14">
             <p:contentPart p14:bwMode="auto" r:id="rId41">
               <p14:nvContentPartPr>
                 <p14:cNvPr id="54" name="Ink 53">
@@ -5159,7 +5179,7 @@
               </p14:xfrm>
             </p:contentPart>
           </mc:Choice>
-          <mc:Fallback>
+          <mc:Fallback xmlns="">
             <p:pic>
               <p:nvPicPr>
                 <p:cNvPr id="54" name="Ink 53">
@@ -5205,8 +5225,8 @@
         </p:nvSpPr>
         <p:spPr>
           <a:xfrm>
-            <a:off x="7399418" y="1630088"/>
-            <a:ext cx="1455398" cy="369332"/>
+            <a:off x="7374347" y="1630088"/>
+            <a:ext cx="1505541" cy="369332"/>
           </a:xfrm>
           <a:prstGeom prst="rect">
             <a:avLst/>
@@ -5221,7 +5241,10 @@
           <a:p>
             <a:pPr algn="ctr"/>
             <a:r>
-              <a:rPr lang="en-US" dirty="0"/>
+              <a:rPr lang="en-US" dirty="0">
+                <a:latin typeface="Source Sans Pro" panose="020B0503030403020204" pitchFamily="34" charset="0"/>
+                <a:ea typeface="Source Sans Pro" panose="020B0503030403020204" pitchFamily="34" charset="0"/>
+              </a:rPr>
               <a:t>Title/Abstract</a:t>
             </a:r>
           </a:p>
@@ -5241,8 +5264,8 @@
         </p:nvSpPr>
         <p:spPr>
           <a:xfrm>
-            <a:off x="7440903" y="2244512"/>
-            <a:ext cx="1337866" cy="830997"/>
+            <a:off x="7419583" y="2244512"/>
+            <a:ext cx="1380507" cy="830997"/>
           </a:xfrm>
           <a:prstGeom prst="rect">
             <a:avLst/>
@@ -5257,28 +5280,40 @@
           <a:p>
             <a:pPr algn="ctr"/>
             <a:r>
-              <a:rPr lang="en-US" sz="1200" dirty="0"/>
+              <a:rPr lang="en-US" sz="1200" dirty="0">
+                <a:latin typeface="Source Sans Pro" panose="020B0503030403020204" pitchFamily="34" charset="0"/>
+                <a:ea typeface="Source Sans Pro" panose="020B0503030403020204" pitchFamily="34" charset="0"/>
+              </a:rPr>
               <a:t>Context</a:t>
             </a:r>
           </a:p>
           <a:p>
             <a:pPr algn="ctr"/>
             <a:r>
-              <a:rPr lang="en-US" sz="1200" dirty="0"/>
+              <a:rPr lang="en-US" sz="1200" dirty="0">
+                <a:latin typeface="Source Sans Pro" panose="020B0503030403020204" pitchFamily="34" charset="0"/>
+                <a:ea typeface="Source Sans Pro" panose="020B0503030403020204" pitchFamily="34" charset="0"/>
+              </a:rPr>
               <a:t>Relevant literature</a:t>
             </a:r>
           </a:p>
           <a:p>
             <a:pPr algn="ctr"/>
             <a:r>
-              <a:rPr lang="en-US" sz="1200" dirty="0"/>
+              <a:rPr lang="en-US" sz="1200" dirty="0">
+                <a:latin typeface="Source Sans Pro" panose="020B0503030403020204" pitchFamily="34" charset="0"/>
+                <a:ea typeface="Source Sans Pro" panose="020B0503030403020204" pitchFamily="34" charset="0"/>
+              </a:rPr>
               <a:t>Question/Gap</a:t>
             </a:r>
           </a:p>
           <a:p>
             <a:pPr algn="ctr"/>
             <a:r>
-              <a:rPr lang="en-US" sz="1200" dirty="0"/>
+              <a:rPr lang="en-US" sz="1200" dirty="0">
+                <a:latin typeface="Source Sans Pro" panose="020B0503030403020204" pitchFamily="34" charset="0"/>
+                <a:ea typeface="Source Sans Pro" panose="020B0503030403020204" pitchFamily="34" charset="0"/>
+              </a:rPr>
               <a:t>Study summary</a:t>
             </a:r>
           </a:p>
@@ -5298,8 +5333,8 @@
         </p:nvSpPr>
         <p:spPr>
           <a:xfrm>
-            <a:off x="7666207" y="3355850"/>
-            <a:ext cx="920508" cy="830997"/>
+            <a:off x="7645400" y="3355850"/>
+            <a:ext cx="962123" cy="830997"/>
           </a:xfrm>
           <a:prstGeom prst="rect">
             <a:avLst/>
@@ -5314,28 +5349,40 @@
           <a:p>
             <a:pPr algn="ctr"/>
             <a:r>
-              <a:rPr lang="en-US" sz="1200" dirty="0"/>
+              <a:rPr lang="en-US" sz="1200" dirty="0">
+                <a:latin typeface="Source Sans Pro" panose="020B0503030403020204" pitchFamily="34" charset="0"/>
+                <a:ea typeface="Source Sans Pro" panose="020B0503030403020204" pitchFamily="34" charset="0"/>
+              </a:rPr>
               <a:t>Participants</a:t>
             </a:r>
           </a:p>
           <a:p>
             <a:pPr algn="ctr"/>
             <a:r>
-              <a:rPr lang="en-US" sz="1200" dirty="0"/>
+              <a:rPr lang="en-US" sz="1200" dirty="0">
+                <a:latin typeface="Source Sans Pro" panose="020B0503030403020204" pitchFamily="34" charset="0"/>
+                <a:ea typeface="Source Sans Pro" panose="020B0503030403020204" pitchFamily="34" charset="0"/>
+              </a:rPr>
               <a:t>Materials</a:t>
             </a:r>
           </a:p>
           <a:p>
             <a:pPr algn="ctr"/>
             <a:r>
-              <a:rPr lang="en-US" sz="1200" dirty="0"/>
+              <a:rPr lang="en-US" sz="1200" dirty="0">
+                <a:latin typeface="Source Sans Pro" panose="020B0503030403020204" pitchFamily="34" charset="0"/>
+                <a:ea typeface="Source Sans Pro" panose="020B0503030403020204" pitchFamily="34" charset="0"/>
+              </a:rPr>
               <a:t>Procedure</a:t>
             </a:r>
           </a:p>
           <a:p>
             <a:pPr algn="ctr"/>
             <a:r>
-              <a:rPr lang="en-US" sz="1200" dirty="0"/>
+              <a:rPr lang="en-US" sz="1200" dirty="0">
+                <a:latin typeface="Source Sans Pro" panose="020B0503030403020204" pitchFamily="34" charset="0"/>
+                <a:ea typeface="Source Sans Pro" panose="020B0503030403020204" pitchFamily="34" charset="0"/>
+              </a:rPr>
               <a:t>Analysis</a:t>
             </a:r>
           </a:p>
@@ -5355,8 +5402,8 @@
         </p:nvSpPr>
         <p:spPr>
           <a:xfrm>
-            <a:off x="7620464" y="4458141"/>
-            <a:ext cx="1012007" cy="646331"/>
+            <a:off x="7605331" y="4458141"/>
+            <a:ext cx="1042273" cy="646331"/>
           </a:xfrm>
           <a:prstGeom prst="rect">
             <a:avLst/>
@@ -5371,21 +5418,30 @@
           <a:p>
             <a:pPr algn="ctr"/>
             <a:r>
-              <a:rPr lang="en-US" sz="1200" dirty="0"/>
+              <a:rPr lang="en-US" sz="1200" dirty="0">
+                <a:latin typeface="Source Sans Pro" panose="020B0503030403020204" pitchFamily="34" charset="0"/>
+                <a:ea typeface="Source Sans Pro" panose="020B0503030403020204" pitchFamily="34" charset="0"/>
+              </a:rPr>
               <a:t>Descriptive</a:t>
             </a:r>
           </a:p>
           <a:p>
             <a:pPr algn="ctr"/>
             <a:r>
-              <a:rPr lang="en-US" sz="1200" dirty="0"/>
+              <a:rPr lang="en-US" sz="1200" dirty="0">
+                <a:latin typeface="Source Sans Pro" panose="020B0503030403020204" pitchFamily="34" charset="0"/>
+                <a:ea typeface="Source Sans Pro" panose="020B0503030403020204" pitchFamily="34" charset="0"/>
+              </a:rPr>
               <a:t>Confirmatory</a:t>
             </a:r>
           </a:p>
           <a:p>
             <a:pPr algn="ctr"/>
             <a:r>
-              <a:rPr lang="en-US" sz="1200" dirty="0"/>
+              <a:rPr lang="en-US" sz="1200" dirty="0">
+                <a:latin typeface="Source Sans Pro" panose="020B0503030403020204" pitchFamily="34" charset="0"/>
+                <a:ea typeface="Source Sans Pro" panose="020B0503030403020204" pitchFamily="34" charset="0"/>
+              </a:rPr>
               <a:t>Exploratory</a:t>
             </a:r>
           </a:p>
@@ -5405,8 +5461,8 @@
         </p:nvSpPr>
         <p:spPr>
           <a:xfrm>
-            <a:off x="7657314" y="5442005"/>
-            <a:ext cx="943400" cy="646331"/>
+            <a:off x="7636732" y="5442005"/>
+            <a:ext cx="984565" cy="646331"/>
           </a:xfrm>
           <a:prstGeom prst="rect">
             <a:avLst/>
@@ -5421,21 +5477,30 @@
           <a:p>
             <a:pPr algn="ctr"/>
             <a:r>
-              <a:rPr lang="en-US" sz="1200" dirty="0"/>
+              <a:rPr lang="en-US" sz="1200" dirty="0">
+                <a:latin typeface="Source Sans Pro" panose="020B0503030403020204" pitchFamily="34" charset="0"/>
+                <a:ea typeface="Source Sans Pro" panose="020B0503030403020204" pitchFamily="34" charset="0"/>
+              </a:rPr>
               <a:t>Summary</a:t>
             </a:r>
           </a:p>
           <a:p>
             <a:pPr algn="ctr"/>
             <a:r>
-              <a:rPr lang="en-US" sz="1200" dirty="0"/>
+              <a:rPr lang="en-US" sz="1200" dirty="0">
+                <a:latin typeface="Source Sans Pro" panose="020B0503030403020204" pitchFamily="34" charset="0"/>
+                <a:ea typeface="Source Sans Pro" panose="020B0503030403020204" pitchFamily="34" charset="0"/>
+              </a:rPr>
               <a:t>Implications</a:t>
             </a:r>
           </a:p>
           <a:p>
             <a:pPr algn="ctr"/>
             <a:r>
-              <a:rPr lang="en-US" sz="1200" dirty="0"/>
+              <a:rPr lang="en-US" sz="1200" dirty="0">
+                <a:latin typeface="Source Sans Pro" panose="020B0503030403020204" pitchFamily="34" charset="0"/>
+                <a:ea typeface="Source Sans Pro" panose="020B0503030403020204" pitchFamily="34" charset="0"/>
+              </a:rPr>
               <a:t>Limitations</a:t>
             </a:r>
           </a:p>

</xml_diff>